<commit_message>
Changed description to include pears - remove lime
</commit_message>
<xml_diff>
--- a/Week05-06/M2_slides/Lab3_1.pptx
+++ b/Week05-06/M2_slides/Lab3_1.pptx
@@ -293,7 +293,7 @@
           <a:p>
             <a:fld id="{1205BC88-DBF0-4610-A802-A09E0A6ECD22}" type="datetimeFigureOut">
               <a:rPr lang="en-AU" smtClean="0"/>
-              <a:t>22/08/2025</a:t>
+              <a:t>27/08/2025</a:t>
             </a:fld>
             <a:endParaRPr lang="en-AU"/>
           </a:p>
@@ -521,7 +521,7 @@
           <a:p>
             <a:fld id="{1205BC88-DBF0-4610-A802-A09E0A6ECD22}" type="datetimeFigureOut">
               <a:rPr lang="en-AU" smtClean="0"/>
-              <a:t>22/08/2025</a:t>
+              <a:t>27/08/2025</a:t>
             </a:fld>
             <a:endParaRPr lang="en-AU"/>
           </a:p>
@@ -701,7 +701,7 @@
           <a:p>
             <a:fld id="{1205BC88-DBF0-4610-A802-A09E0A6ECD22}" type="datetimeFigureOut">
               <a:rPr lang="en-AU" smtClean="0"/>
-              <a:t>22/08/2025</a:t>
+              <a:t>27/08/2025</a:t>
             </a:fld>
             <a:endParaRPr lang="en-AU"/>
           </a:p>
@@ -871,7 +871,7 @@
           <a:p>
             <a:fld id="{1205BC88-DBF0-4610-A802-A09E0A6ECD22}" type="datetimeFigureOut">
               <a:rPr lang="en-AU" smtClean="0"/>
-              <a:t>22/08/2025</a:t>
+              <a:t>27/08/2025</a:t>
             </a:fld>
             <a:endParaRPr lang="en-AU"/>
           </a:p>
@@ -1125,7 +1125,7 @@
           <a:p>
             <a:fld id="{1205BC88-DBF0-4610-A802-A09E0A6ECD22}" type="datetimeFigureOut">
               <a:rPr lang="en-AU" smtClean="0"/>
-              <a:t>22/08/2025</a:t>
+              <a:t>27/08/2025</a:t>
             </a:fld>
             <a:endParaRPr lang="en-AU"/>
           </a:p>
@@ -1451,7 +1451,7 @@
           <a:p>
             <a:fld id="{1205BC88-DBF0-4610-A802-A09E0A6ECD22}" type="datetimeFigureOut">
               <a:rPr lang="en-AU" smtClean="0"/>
-              <a:t>22/08/2025</a:t>
+              <a:t>27/08/2025</a:t>
             </a:fld>
             <a:endParaRPr lang="en-AU"/>
           </a:p>
@@ -1902,7 +1902,7 @@
           <a:p>
             <a:fld id="{1205BC88-DBF0-4610-A802-A09E0A6ECD22}" type="datetimeFigureOut">
               <a:rPr lang="en-AU" smtClean="0"/>
-              <a:t>22/08/2025</a:t>
+              <a:t>27/08/2025</a:t>
             </a:fld>
             <a:endParaRPr lang="en-AU"/>
           </a:p>
@@ -2020,7 +2020,7 @@
           <a:p>
             <a:fld id="{1205BC88-DBF0-4610-A802-A09E0A6ECD22}" type="datetimeFigureOut">
               <a:rPr lang="en-AU" smtClean="0"/>
-              <a:t>22/08/2025</a:t>
+              <a:t>27/08/2025</a:t>
             </a:fld>
             <a:endParaRPr lang="en-AU"/>
           </a:p>
@@ -2115,7 +2115,7 @@
           <a:p>
             <a:fld id="{1205BC88-DBF0-4610-A802-A09E0A6ECD22}" type="datetimeFigureOut">
               <a:rPr lang="en-AU" smtClean="0"/>
-              <a:t>22/08/2025</a:t>
+              <a:t>27/08/2025</a:t>
             </a:fld>
             <a:endParaRPr lang="en-AU"/>
           </a:p>
@@ -2402,7 +2402,7 @@
           <a:p>
             <a:fld id="{1205BC88-DBF0-4610-A802-A09E0A6ECD22}" type="datetimeFigureOut">
               <a:rPr lang="en-AU" smtClean="0"/>
-              <a:t>22/08/2025</a:t>
+              <a:t>27/08/2025</a:t>
             </a:fld>
             <a:endParaRPr lang="en-AU"/>
           </a:p>
@@ -2724,7 +2724,7 @@
           <a:p>
             <a:fld id="{1205BC88-DBF0-4610-A802-A09E0A6ECD22}" type="datetimeFigureOut">
               <a:rPr lang="en-AU" smtClean="0"/>
-              <a:t>22/08/2025</a:t>
+              <a:t>27/08/2025</a:t>
             </a:fld>
             <a:endParaRPr lang="en-AU"/>
           </a:p>
@@ -2978,7 +2978,7 @@
           <a:p>
             <a:fld id="{1205BC88-DBF0-4610-A802-A09E0A6ECD22}" type="datetimeFigureOut">
               <a:rPr lang="en-AU" smtClean="0"/>
-              <a:t>22/08/2025</a:t>
+              <a:t>27/08/2025</a:t>
             </a:fld>
             <a:endParaRPr lang="en-AU"/>
           </a:p>
@@ -7049,7 +7049,7 @@
         <p:spPr>
           <a:xfrm>
             <a:off x="486418" y="806896"/>
-            <a:ext cx="11527007" cy="6401753"/>
+            <a:ext cx="11527007" cy="6093976"/>
           </a:xfrm>
           <a:prstGeom prst="rect">
             <a:avLst/>
@@ -7131,22 +7131,47 @@
             <a:endParaRPr lang="en-US" dirty="0"/>
           </a:p>
           <a:p>
-            <a:endParaRPr lang="en-US" dirty="0"/>
-          </a:p>
-          <a:p>
-            <a:endParaRPr lang="en-US" dirty="0"/>
-          </a:p>
-          <a:p>
-            <a:endParaRPr lang="en-US" dirty="0"/>
+            <a:pPr algn="ctr"/>
+            <a:r>
+              <a:rPr lang="en-US" sz="1600" dirty="0"/>
+              <a:t>This is a placeholder image. </a:t>
+            </a:r>
           </a:p>
           <a:p>
             <a:r>
               <a:rPr lang="en-US" dirty="0"/>
-              <a:t>      lemon          pumpkin         tomato      pear      capsicum   garlic        potato           lime</a:t>
-            </a:r>
-          </a:p>
-          <a:p>
-            <a:endParaRPr lang="en-US" dirty="0"/>
+              <a:t>The target list includes orange, lemon, tomato, garlic, potato, capsicum (different </a:t>
+            </a:r>
+            <a:r>
+              <a:rPr lang="en-US" dirty="0" err="1"/>
+              <a:t>colours</a:t>
+            </a:r>
+            <a:r>
+              <a:rPr lang="en-US" dirty="0"/>
+              <a:t>), different </a:t>
+            </a:r>
+            <a:r>
+              <a:rPr lang="en-US" dirty="0" err="1"/>
+              <a:t>colours</a:t>
+            </a:r>
+            <a:r>
+              <a:rPr lang="en-US" dirty="0"/>
+              <a:t> of pears and different </a:t>
+            </a:r>
+            <a:r>
+              <a:rPr lang="en-US" dirty="0" err="1"/>
+              <a:t>colours</a:t>
+            </a:r>
+            <a:r>
+              <a:rPr lang="en-US" dirty="0"/>
+              <a:t> of pumpkin</a:t>
+            </a:r>
+          </a:p>
+          <a:p>
+            <a:r>
+              <a:rPr lang="en-US" dirty="0"/>
+              <a:t>      </a:t>
+            </a:r>
           </a:p>
           <a:p>
             <a:r>
@@ -7193,7 +7218,7 @@
           </p:cNvPicPr>
           <p:nvPr/>
         </p:nvPicPr>
-        <p:blipFill>
+        <p:blipFill rotWithShape="1">
           <a:blip r:embed="rId4">
             <a:extLst>
               <a:ext uri="{28A0092B-C50C-407E-A947-70E740481C1C}">
@@ -7201,15 +7226,15 @@
               </a:ext>
             </a:extLst>
           </a:blip>
-          <a:srcRect/>
+          <a:srcRect l="10951"/>
           <a:stretch>
             <a:fillRect/>
           </a:stretch>
         </p:blipFill>
         <p:spPr bwMode="auto">
           <a:xfrm>
-            <a:off x="856607" y="3019718"/>
-            <a:ext cx="9559636" cy="2846731"/>
+            <a:off x="1978091" y="2963689"/>
+            <a:ext cx="8512800" cy="2156351"/>
           </a:xfrm>
           <a:prstGeom prst="rect">
             <a:avLst/>

</xml_diff>

<commit_message>
Changed lime to pear in readme + slides
</commit_message>
<xml_diff>
--- a/Week05-06/M2_slides/Lab3_1.pptx
+++ b/Week05-06/M2_slides/Lab3_1.pptx
@@ -7028,9 +7028,10 @@
           <a:p>
             <a:pPr algn="ctr"/>
             <a:r>
-              <a:rPr lang="en-AU" sz="4800" dirty="0"/>
+              <a:rPr lang="en-AU" sz="4800"/>
               <a:t>Milestone 2</a:t>
             </a:r>
+            <a:endParaRPr lang="en-AU" sz="4800" dirty="0"/>
           </a:p>
         </p:txBody>
       </p:sp>
@@ -7049,7 +7050,7 @@
         <p:spPr>
           <a:xfrm>
             <a:off x="486418" y="806896"/>
-            <a:ext cx="11527007" cy="6093976"/>
+            <a:ext cx="11527007" cy="5570756"/>
           </a:xfrm>
           <a:prstGeom prst="rect">
             <a:avLst/>
@@ -7131,40 +7132,9 @@
             <a:endParaRPr lang="en-US" dirty="0"/>
           </a:p>
           <a:p>
-            <a:pPr algn="ctr"/>
-            <a:r>
-              <a:rPr lang="en-US" sz="1600" dirty="0"/>
-              <a:t>This is a placeholder image. </a:t>
-            </a:r>
-          </a:p>
-          <a:p>
             <a:r>
               <a:rPr lang="en-US" dirty="0"/>
-              <a:t>The target list includes orange, lemon, tomato, garlic, potato, capsicum (different </a:t>
-            </a:r>
-            <a:r>
-              <a:rPr lang="en-US" dirty="0" err="1"/>
-              <a:t>colours</a:t>
-            </a:r>
-            <a:r>
-              <a:rPr lang="en-US" dirty="0"/>
-              <a:t>), different </a:t>
-            </a:r>
-            <a:r>
-              <a:rPr lang="en-US" dirty="0" err="1"/>
-              <a:t>colours</a:t>
-            </a:r>
-            <a:r>
-              <a:rPr lang="en-US" dirty="0"/>
-              <a:t> of pears and different </a:t>
-            </a:r>
-            <a:r>
-              <a:rPr lang="en-US" dirty="0" err="1"/>
-              <a:t>colours</a:t>
-            </a:r>
-            <a:r>
-              <a:rPr lang="en-US" dirty="0"/>
-              <a:t> of pumpkin</a:t>
+              <a:t>The target list includes garlic, tomato, pumpkin, capsicum, pear, potato, lemon and orange.</a:t>
             </a:r>
           </a:p>
           <a:p>
@@ -7218,7 +7188,7 @@
           </p:cNvPicPr>
           <p:nvPr/>
         </p:nvPicPr>
-        <p:blipFill rotWithShape="1">
+        <p:blipFill>
           <a:blip r:embed="rId4">
             <a:extLst>
               <a:ext uri="{28A0092B-C50C-407E-A947-70E740481C1C}">
@@ -7226,10 +7196,8 @@
               </a:ext>
             </a:extLst>
           </a:blip>
-          <a:srcRect l="10951"/>
-          <a:stretch>
-            <a:fillRect/>
-          </a:stretch>
+          <a:srcRect t="33113" b="33113"/>
+          <a:stretch/>
         </p:blipFill>
         <p:spPr bwMode="auto">
           <a:xfrm>

</xml_diff>